<commit_message>
adding git push command on slide 41
</commit_message>
<xml_diff>
--- a/DEM-05-CollaborativeTools.pptx
+++ b/DEM-05-CollaborativeTools.pptx
@@ -255,7 +255,7 @@
           <a:p>
             <a:fld id="{8E40A6B4-8D20-EE4D-BF5B-C9004ACF6E6E}" type="datetimeFigureOut">
               <a:rPr lang="fr-FR" smtClean="0"/>
-              <a:t>5/1/13</a:t>
+              <a:t>5/2/13</a:t>
             </a:fld>
             <a:endParaRPr lang="fr-FR"/>
           </a:p>
@@ -421,7 +421,7 @@
           <a:p>
             <a:fld id="{9D456323-9590-BC4F-ADDE-664574C34CDA}" type="datetimeFigureOut">
               <a:rPr lang="fr-FR" smtClean="0"/>
-              <a:t>5/1/13</a:t>
+              <a:t>5/2/13</a:t>
             </a:fld>
             <a:endParaRPr lang="fr-FR"/>
           </a:p>
@@ -2931,6 +2931,13 @@
   <p:clrMapOvr>
     <a:masterClrMapping/>
   </p:clrMapOvr>
+  <p:timing>
+    <p:tnLst>
+      <p:par>
+        <p:cTn xmlns:p14="http://schemas.microsoft.com/office/powerpoint/2010/main" id="1" dur="indefinite" restart="never" nodeType="tmRoot"/>
+      </p:par>
+    </p:tnLst>
+  </p:timing>
 </p:sld>
 </file>
 
@@ -3256,6 +3263,13 @@
   <p:clrMapOvr>
     <a:masterClrMapping/>
   </p:clrMapOvr>
+  <p:timing>
+    <p:tnLst>
+      <p:par>
+        <p:cTn xmlns:p14="http://schemas.microsoft.com/office/powerpoint/2010/main" id="1" dur="indefinite" restart="never" nodeType="tmRoot"/>
+      </p:par>
+    </p:tnLst>
+  </p:timing>
 </p:sld>
 </file>
 
@@ -3470,6 +3484,13 @@
   <p:clrMapOvr>
     <a:masterClrMapping/>
   </p:clrMapOvr>
+  <p:timing>
+    <p:tnLst>
+      <p:par>
+        <p:cTn xmlns:p14="http://schemas.microsoft.com/office/powerpoint/2010/main" id="1" dur="indefinite" restart="never" nodeType="tmRoot"/>
+      </p:par>
+    </p:tnLst>
+  </p:timing>
 </p:sld>
 </file>
 
@@ -3610,6 +3631,13 @@
   <p:clrMapOvr>
     <a:masterClrMapping/>
   </p:clrMapOvr>
+  <p:timing>
+    <p:tnLst>
+      <p:par>
+        <p:cTn xmlns:p14="http://schemas.microsoft.com/office/powerpoint/2010/main" id="1" dur="indefinite" restart="never" nodeType="tmRoot"/>
+      </p:par>
+    </p:tnLst>
+  </p:timing>
 </p:sld>
 </file>
 
@@ -3969,6 +3997,13 @@
   <p:clrMapOvr>
     <a:masterClrMapping/>
   </p:clrMapOvr>
+  <p:timing>
+    <p:tnLst>
+      <p:par>
+        <p:cTn xmlns:p14="http://schemas.microsoft.com/office/powerpoint/2010/main" id="1" dur="indefinite" restart="never" nodeType="tmRoot"/>
+      </p:par>
+    </p:tnLst>
+  </p:timing>
 </p:sld>
 </file>
 
@@ -4118,6 +4153,13 @@
   <p:clrMapOvr>
     <a:masterClrMapping/>
   </p:clrMapOvr>
+  <p:timing>
+    <p:tnLst>
+      <p:par>
+        <p:cTn xmlns:p14="http://schemas.microsoft.com/office/powerpoint/2010/main" id="1" dur="indefinite" restart="never" nodeType="tmRoot"/>
+      </p:par>
+    </p:tnLst>
+  </p:timing>
 </p:sld>
 </file>
 
@@ -4228,6 +4270,13 @@
   <p:clrMapOvr>
     <a:masterClrMapping/>
   </p:clrMapOvr>
+  <p:timing>
+    <p:tnLst>
+      <p:par>
+        <p:cTn xmlns:p14="http://schemas.microsoft.com/office/powerpoint/2010/main" id="1" dur="indefinite" restart="never" nodeType="tmRoot"/>
+      </p:par>
+    </p:tnLst>
+  </p:timing>
 </p:sld>
 </file>
 
@@ -4565,6 +4614,13 @@
   <p:clrMapOvr>
     <a:masterClrMapping/>
   </p:clrMapOvr>
+  <p:timing>
+    <p:tnLst>
+      <p:par>
+        <p:cTn xmlns:p14="http://schemas.microsoft.com/office/powerpoint/2010/main" id="1" dur="indefinite" restart="never" nodeType="tmRoot"/>
+      </p:par>
+    </p:tnLst>
+  </p:timing>
 </p:sld>
 </file>
 
@@ -4777,6 +4833,13 @@
   <p:clrMapOvr>
     <a:masterClrMapping/>
   </p:clrMapOvr>
+  <p:timing>
+    <p:tnLst>
+      <p:par>
+        <p:cTn xmlns:p14="http://schemas.microsoft.com/office/powerpoint/2010/main" id="1" dur="indefinite" restart="never" nodeType="tmRoot"/>
+      </p:par>
+    </p:tnLst>
+  </p:timing>
 </p:sld>
 </file>
 
@@ -4933,6 +4996,13 @@
   <p:clrMapOvr>
     <a:masterClrMapping/>
   </p:clrMapOvr>
+  <p:timing>
+    <p:tnLst>
+      <p:par>
+        <p:cTn xmlns:p14="http://schemas.microsoft.com/office/powerpoint/2010/main" id="1" dur="indefinite" restart="never" nodeType="tmRoot"/>
+      </p:par>
+    </p:tnLst>
+  </p:timing>
 </p:sld>
 </file>
 
@@ -5325,6 +5395,13 @@
   <p:clrMapOvr>
     <a:masterClrMapping/>
   </p:clrMapOvr>
+  <p:timing>
+    <p:tnLst>
+      <p:par>
+        <p:cTn xmlns:p14="http://schemas.microsoft.com/office/powerpoint/2010/main" id="1" dur="indefinite" restart="never" nodeType="tmRoot"/>
+      </p:par>
+    </p:tnLst>
+  </p:timing>
 </p:sld>
 </file>
 
@@ -5485,6 +5562,13 @@
   <p:clrMapOvr>
     <a:masterClrMapping/>
   </p:clrMapOvr>
+  <p:timing>
+    <p:tnLst>
+      <p:par>
+        <p:cTn xmlns:p14="http://schemas.microsoft.com/office/powerpoint/2010/main" id="1" dur="indefinite" restart="never" nodeType="tmRoot"/>
+      </p:par>
+    </p:tnLst>
+  </p:timing>
 </p:sld>
 </file>
 
@@ -5691,6 +5775,13 @@
   <p:clrMapOvr>
     <a:masterClrMapping/>
   </p:clrMapOvr>
+  <p:timing>
+    <p:tnLst>
+      <p:par>
+        <p:cTn xmlns:p14="http://schemas.microsoft.com/office/powerpoint/2010/main" id="1" dur="indefinite" restart="never" nodeType="tmRoot"/>
+      </p:par>
+    </p:tnLst>
+  </p:timing>
 </p:sld>
 </file>
 
@@ -5924,6 +6015,13 @@
   <p:clrMapOvr>
     <a:masterClrMapping/>
   </p:clrMapOvr>
+  <p:timing>
+    <p:tnLst>
+      <p:par>
+        <p:cTn xmlns:p14="http://schemas.microsoft.com/office/powerpoint/2010/main" id="1" dur="indefinite" restart="never" nodeType="tmRoot"/>
+      </p:par>
+    </p:tnLst>
+  </p:timing>
 </p:sld>
 </file>
 
@@ -6030,6 +6128,13 @@
   <p:clrMapOvr>
     <a:masterClrMapping/>
   </p:clrMapOvr>
+  <p:timing>
+    <p:tnLst>
+      <p:par>
+        <p:cTn xmlns:p14="http://schemas.microsoft.com/office/powerpoint/2010/main" id="1" dur="indefinite" restart="never" nodeType="tmRoot"/>
+      </p:par>
+    </p:tnLst>
+  </p:timing>
 </p:sld>
 </file>
 
@@ -6166,6 +6271,13 @@
   <p:clrMapOvr>
     <a:masterClrMapping/>
   </p:clrMapOvr>
+  <p:timing>
+    <p:tnLst>
+      <p:par>
+        <p:cTn xmlns:p14="http://schemas.microsoft.com/office/powerpoint/2010/main" id="1" dur="indefinite" restart="never" nodeType="tmRoot"/>
+      </p:par>
+    </p:tnLst>
+  </p:timing>
 </p:sld>
 </file>
 
@@ -6885,6 +6997,13 @@
   <p:clrMapOvr>
     <a:masterClrMapping/>
   </p:clrMapOvr>
+  <p:timing>
+    <p:tnLst>
+      <p:par>
+        <p:cTn xmlns:p14="http://schemas.microsoft.com/office/powerpoint/2010/main" id="1" dur="indefinite" restart="never" nodeType="tmRoot"/>
+      </p:par>
+    </p:tnLst>
+  </p:timing>
 </p:sld>
 </file>
 
@@ -8408,6 +8527,13 @@
   <p:clrMapOvr>
     <a:masterClrMapping/>
   </p:clrMapOvr>
+  <p:timing>
+    <p:tnLst>
+      <p:par>
+        <p:cTn xmlns:p14="http://schemas.microsoft.com/office/powerpoint/2010/main" id="1" dur="indefinite" restart="never" nodeType="tmRoot"/>
+      </p:par>
+    </p:tnLst>
+  </p:timing>
 </p:sld>
 </file>
 
@@ -11328,6 +11454,13 @@
   <p:clrMapOvr>
     <a:masterClrMapping/>
   </p:clrMapOvr>
+  <p:timing>
+    <p:tnLst>
+      <p:par>
+        <p:cTn xmlns:p14="http://schemas.microsoft.com/office/powerpoint/2010/main" id="1" dur="indefinite" restart="never" nodeType="tmRoot"/>
+      </p:par>
+    </p:tnLst>
+  </p:timing>
 </p:sld>
 </file>
 
@@ -11579,6 +11712,13 @@
   <p:clrMapOvr>
     <a:masterClrMapping/>
   </p:clrMapOvr>
+  <p:timing>
+    <p:tnLst>
+      <p:par>
+        <p:cTn xmlns:p14="http://schemas.microsoft.com/office/powerpoint/2010/main" id="1" dur="indefinite" restart="never" nodeType="tmRoot"/>
+      </p:par>
+    </p:tnLst>
+  </p:timing>
 </p:sld>
 </file>
 
@@ -11860,6 +12000,13 @@
   <p:clrMapOvr>
     <a:masterClrMapping/>
   </p:clrMapOvr>
+  <p:timing>
+    <p:tnLst>
+      <p:par>
+        <p:cTn xmlns:p14="http://schemas.microsoft.com/office/powerpoint/2010/main" id="1" dur="indefinite" restart="never" nodeType="tmRoot"/>
+      </p:par>
+    </p:tnLst>
+  </p:timing>
 </p:sld>
 </file>
 
@@ -12690,26 +12837,14 @@
           <a:p>
             <a:r>
               <a:rPr lang="en-US" dirty="0" smtClean="0"/>
-              <a:t>Software Configuration </a:t>
-            </a:r>
-            <a:r>
-              <a:rPr lang="en-US" dirty="0" smtClean="0"/>
-              <a:t>Management</a:t>
+              <a:t>Software Configuration Management</a:t>
             </a:r>
           </a:p>
           <a:p>
             <a:pPr lvl="1"/>
             <a:r>
               <a:rPr lang="en-US" dirty="0" smtClean="0"/>
-              <a:t>Is a tool to manage </a:t>
-            </a:r>
-            <a:r>
-              <a:rPr lang="en-US" dirty="0" smtClean="0"/>
-              <a:t>your source </a:t>
-            </a:r>
-            <a:r>
-              <a:rPr lang="en-US" dirty="0" smtClean="0"/>
-              <a:t>code</a:t>
+              <a:t>Is a tool to manage your source code</a:t>
             </a:r>
           </a:p>
           <a:p>
@@ -12763,6 +12898,13 @@
   <p:clrMapOvr>
     <a:masterClrMapping/>
   </p:clrMapOvr>
+  <p:timing>
+    <p:tnLst>
+      <p:par>
+        <p:cTn xmlns:p14="http://schemas.microsoft.com/office/powerpoint/2010/main" id="1" dur="indefinite" restart="never" nodeType="tmRoot"/>
+      </p:par>
+    </p:tnLst>
+  </p:timing>
 </p:sld>
 </file>
 
@@ -13007,7 +13149,31 @@
                 <a:latin typeface="Monaco"/>
                 <a:cs typeface="Monaco"/>
               </a:rPr>
-              <a:t> remote add origin https://…</a:t>
+              <a:t> remote add origin https://</a:t>
+            </a:r>
+            <a:r>
+              <a:rPr lang="en-US" sz="1500" dirty="0" smtClean="0">
+                <a:latin typeface="Monaco"/>
+                <a:cs typeface="Monaco"/>
+              </a:rPr>
+              <a:t>…</a:t>
+            </a:r>
+          </a:p>
+          <a:p>
+            <a:pPr lvl="1"/>
+            <a:r>
+              <a:rPr lang="en-US" sz="1500" dirty="0" err="1" smtClean="0">
+                <a:latin typeface="Monaco"/>
+                <a:cs typeface="Monaco"/>
+              </a:rPr>
+              <a:t>git</a:t>
+            </a:r>
+            <a:r>
+              <a:rPr lang="en-US" sz="1500" dirty="0" smtClean="0">
+                <a:latin typeface="Monaco"/>
+                <a:cs typeface="Monaco"/>
+              </a:rPr>
+              <a:t> push –u origin master</a:t>
             </a:r>
             <a:endParaRPr lang="en-US" sz="1500" dirty="0">
               <a:latin typeface="Monaco"/>
@@ -13178,6 +13344,13 @@
   <p:clrMapOvr>
     <a:masterClrMapping/>
   </p:clrMapOvr>
+  <p:timing>
+    <p:tnLst>
+      <p:par>
+        <p:cTn xmlns:p14="http://schemas.microsoft.com/office/powerpoint/2010/main" id="1" dur="indefinite" restart="never" nodeType="tmRoot"/>
+      </p:par>
+    </p:tnLst>
+  </p:timing>
 </p:sld>
 </file>
 
@@ -13285,6 +13458,13 @@
   <p:clrMapOvr>
     <a:masterClrMapping/>
   </p:clrMapOvr>
+  <p:timing>
+    <p:tnLst>
+      <p:par>
+        <p:cTn xmlns:p14="http://schemas.microsoft.com/office/powerpoint/2010/main" id="1" dur="indefinite" restart="never" nodeType="tmRoot"/>
+      </p:par>
+    </p:tnLst>
+  </p:timing>
 </p:sld>
 </file>
 
@@ -13465,6 +13645,13 @@
   <p:clrMapOvr>
     <a:masterClrMapping/>
   </p:clrMapOvr>
+  <p:timing>
+    <p:tnLst>
+      <p:par>
+        <p:cTn xmlns:p14="http://schemas.microsoft.com/office/powerpoint/2010/main" id="1" dur="indefinite" restart="never" nodeType="tmRoot"/>
+      </p:par>
+    </p:tnLst>
+  </p:timing>
 </p:sld>
 </file>
 
@@ -13681,6 +13868,13 @@
   <p:clrMapOvr>
     <a:masterClrMapping/>
   </p:clrMapOvr>
+  <p:timing>
+    <p:tnLst>
+      <p:par>
+        <p:cTn xmlns:p14="http://schemas.microsoft.com/office/powerpoint/2010/main" id="1" dur="indefinite" restart="never" nodeType="tmRoot"/>
+      </p:par>
+    </p:tnLst>
+  </p:timing>
 </p:sld>
 </file>
 
@@ -13828,6 +14022,13 @@
   <p:clrMapOvr>
     <a:masterClrMapping/>
   </p:clrMapOvr>
+  <p:timing>
+    <p:tnLst>
+      <p:par>
+        <p:cTn xmlns:p14="http://schemas.microsoft.com/office/powerpoint/2010/main" id="1" dur="indefinite" restart="never" nodeType="tmRoot"/>
+      </p:par>
+    </p:tnLst>
+  </p:timing>
 </p:sld>
 </file>
 
@@ -14054,6 +14255,13 @@
   <p:clrMapOvr>
     <a:masterClrMapping/>
   </p:clrMapOvr>
+  <p:timing>
+    <p:tnLst>
+      <p:par>
+        <p:cTn xmlns:p14="http://schemas.microsoft.com/office/powerpoint/2010/main" id="1" dur="indefinite" restart="never" nodeType="tmRoot"/>
+      </p:par>
+    </p:tnLst>
+  </p:timing>
 </p:sld>
 </file>
 
@@ -14373,6 +14581,13 @@
   <p:clrMapOvr>
     <a:masterClrMapping/>
   </p:clrMapOvr>
+  <p:timing>
+    <p:tnLst>
+      <p:par>
+        <p:cTn xmlns:p14="http://schemas.microsoft.com/office/powerpoint/2010/main" id="1" dur="indefinite" restart="never" nodeType="tmRoot"/>
+      </p:par>
+    </p:tnLst>
+  </p:timing>
 </p:sld>
 </file>
 
@@ -14685,6 +14900,13 @@
   <p:clrMapOvr>
     <a:masterClrMapping/>
   </p:clrMapOvr>
+  <p:timing>
+    <p:tnLst>
+      <p:par>
+        <p:cTn xmlns:p14="http://schemas.microsoft.com/office/powerpoint/2010/main" id="1" dur="indefinite" restart="never" nodeType="tmRoot"/>
+      </p:par>
+    </p:tnLst>
+  </p:timing>
 </p:sld>
 </file>
 
@@ -14850,6 +15072,13 @@
   <p:clrMapOvr>
     <a:masterClrMapping/>
   </p:clrMapOvr>
+  <p:timing>
+    <p:tnLst>
+      <p:par>
+        <p:cTn xmlns:p14="http://schemas.microsoft.com/office/powerpoint/2010/main" id="1" dur="indefinite" restart="never" nodeType="tmRoot"/>
+      </p:par>
+    </p:tnLst>
+  </p:timing>
 </p:sld>
 </file>
 
@@ -15041,6 +15270,13 @@
   <p:clrMapOvr>
     <a:masterClrMapping/>
   </p:clrMapOvr>
+  <p:timing>
+    <p:tnLst>
+      <p:par>
+        <p:cTn xmlns:p14="http://schemas.microsoft.com/office/powerpoint/2010/main" id="1" dur="indefinite" restart="never" nodeType="tmRoot"/>
+      </p:par>
+    </p:tnLst>
+  </p:timing>
 </p:sld>
 </file>
 
@@ -15156,6 +15392,13 @@
   <p:clrMapOvr>
     <a:masterClrMapping/>
   </p:clrMapOvr>
+  <p:timing>
+    <p:tnLst>
+      <p:par>
+        <p:cTn xmlns:p14="http://schemas.microsoft.com/office/powerpoint/2010/main" id="1" dur="indefinite" restart="never" nodeType="tmRoot"/>
+      </p:par>
+    </p:tnLst>
+  </p:timing>
 </p:sld>
 </file>
 
@@ -15304,6 +15547,13 @@
   <p:clrMapOvr>
     <a:masterClrMapping/>
   </p:clrMapOvr>
+  <p:timing>
+    <p:tnLst>
+      <p:par>
+        <p:cTn xmlns:p14="http://schemas.microsoft.com/office/powerpoint/2010/main" id="1" dur="indefinite" restart="never" nodeType="tmRoot"/>
+      </p:par>
+    </p:tnLst>
+  </p:timing>
 </p:sld>
 </file>
 
@@ -15439,6 +15689,13 @@
   <p:clrMapOvr>
     <a:masterClrMapping/>
   </p:clrMapOvr>
+  <p:timing>
+    <p:tnLst>
+      <p:par>
+        <p:cTn xmlns:p14="http://schemas.microsoft.com/office/powerpoint/2010/main" id="1" dur="indefinite" restart="never" nodeType="tmRoot"/>
+      </p:par>
+    </p:tnLst>
+  </p:timing>
 </p:sld>
 </file>
 
@@ -15550,6 +15807,13 @@
   <p:clrMapOvr>
     <a:masterClrMapping/>
   </p:clrMapOvr>
+  <p:timing>
+    <p:tnLst>
+      <p:par>
+        <p:cTn xmlns:p14="http://schemas.microsoft.com/office/powerpoint/2010/main" id="1" dur="indefinite" restart="never" nodeType="tmRoot"/>
+      </p:par>
+    </p:tnLst>
+  </p:timing>
 </p:sld>
 </file>
 
@@ -15713,6 +15977,13 @@
   <p:clrMapOvr>
     <a:masterClrMapping/>
   </p:clrMapOvr>
+  <p:timing>
+    <p:tnLst>
+      <p:par>
+        <p:cTn xmlns:p14="http://schemas.microsoft.com/office/powerpoint/2010/main" id="1" dur="indefinite" restart="never" nodeType="tmRoot"/>
+      </p:par>
+    </p:tnLst>
+  </p:timing>
 </p:sld>
 </file>
 
@@ -15824,6 +16095,13 @@
   <p:clrMapOvr>
     <a:masterClrMapping/>
   </p:clrMapOvr>
+  <p:timing>
+    <p:tnLst>
+      <p:par>
+        <p:cTn xmlns:p14="http://schemas.microsoft.com/office/powerpoint/2010/main" id="1" dur="indefinite" restart="never" nodeType="tmRoot"/>
+      </p:par>
+    </p:tnLst>
+  </p:timing>
 </p:sld>
 </file>
 
@@ -15990,6 +16268,13 @@
   <p:clrMapOvr>
     <a:masterClrMapping/>
   </p:clrMapOvr>
+  <p:timing>
+    <p:tnLst>
+      <p:par>
+        <p:cTn xmlns:p14="http://schemas.microsoft.com/office/powerpoint/2010/main" id="1" dur="indefinite" restart="never" nodeType="tmRoot"/>
+      </p:par>
+    </p:tnLst>
+  </p:timing>
 </p:sld>
 </file>
 
@@ -16179,6 +16464,13 @@
   <p:clrMapOvr>
     <a:masterClrMapping/>
   </p:clrMapOvr>
+  <p:timing>
+    <p:tnLst>
+      <p:par>
+        <p:cTn xmlns:p14="http://schemas.microsoft.com/office/powerpoint/2010/main" id="1" dur="indefinite" restart="never" nodeType="tmRoot"/>
+      </p:par>
+    </p:tnLst>
+  </p:timing>
 </p:sld>
 </file>
 
@@ -16279,6 +16571,13 @@
   <p:clrMapOvr>
     <a:masterClrMapping/>
   </p:clrMapOvr>
+  <p:timing>
+    <p:tnLst>
+      <p:par>
+        <p:cTn xmlns:p14="http://schemas.microsoft.com/office/powerpoint/2010/main" id="1" dur="indefinite" restart="never" nodeType="tmRoot"/>
+      </p:par>
+    </p:tnLst>
+  </p:timing>
 </p:sld>
 </file>
 
@@ -16453,6 +16752,13 @@
   <p:clrMapOvr>
     <a:masterClrMapping/>
   </p:clrMapOvr>
+  <p:timing>
+    <p:tnLst>
+      <p:par>
+        <p:cTn xmlns:p14="http://schemas.microsoft.com/office/powerpoint/2010/main" id="1" dur="indefinite" restart="never" nodeType="tmRoot"/>
+      </p:par>
+    </p:tnLst>
+  </p:timing>
 </p:sld>
 </file>
 
@@ -16599,6 +16905,13 @@
   <p:clrMapOvr>
     <a:masterClrMapping/>
   </p:clrMapOvr>
+  <p:timing>
+    <p:tnLst>
+      <p:par>
+        <p:cTn xmlns:p14="http://schemas.microsoft.com/office/powerpoint/2010/main" id="1" dur="indefinite" restart="never" nodeType="tmRoot"/>
+      </p:par>
+    </p:tnLst>
+  </p:timing>
 </p:sld>
 </file>
 
@@ -16790,6 +17103,13 @@
   <p:clrMapOvr>
     <a:masterClrMapping/>
   </p:clrMapOvr>
+  <p:timing>
+    <p:tnLst>
+      <p:par>
+        <p:cTn xmlns:p14="http://schemas.microsoft.com/office/powerpoint/2010/main" id="1" dur="indefinite" restart="never" nodeType="tmRoot"/>
+      </p:par>
+    </p:tnLst>
+  </p:timing>
 </p:sld>
 </file>
 
@@ -17167,6 +17487,13 @@
   <p:clrMapOvr>
     <a:masterClrMapping/>
   </p:clrMapOvr>
+  <p:timing>
+    <p:tnLst>
+      <p:par>
+        <p:cTn xmlns:p14="http://schemas.microsoft.com/office/powerpoint/2010/main" id="1" dur="indefinite" restart="never" nodeType="tmRoot"/>
+      </p:par>
+    </p:tnLst>
+  </p:timing>
 </p:sld>
 </file>
 
@@ -17318,6 +17645,13 @@
   <p:clrMapOvr>
     <a:masterClrMapping/>
   </p:clrMapOvr>
+  <p:timing>
+    <p:tnLst>
+      <p:par>
+        <p:cTn xmlns:p14="http://schemas.microsoft.com/office/powerpoint/2010/main" id="1" dur="indefinite" restart="never" nodeType="tmRoot"/>
+      </p:par>
+    </p:tnLst>
+  </p:timing>
 </p:sld>
 </file>
 
@@ -17638,6 +17972,13 @@
   <p:clrMapOvr>
     <a:masterClrMapping/>
   </p:clrMapOvr>
+  <p:timing>
+    <p:tnLst>
+      <p:par>
+        <p:cTn xmlns:p14="http://schemas.microsoft.com/office/powerpoint/2010/main" id="1" dur="indefinite" restart="never" nodeType="tmRoot"/>
+      </p:par>
+    </p:tnLst>
+  </p:timing>
 </p:sld>
 </file>
 

</xml_diff>

<commit_message>
Fixing git mv syntax on slide 19 (fix #1)
</commit_message>
<xml_diff>
--- a/DEM-05-CollaborativeTools.pptx
+++ b/DEM-05-CollaborativeTools.pptx
@@ -255,7 +255,7 @@
           <a:p>
             <a:fld id="{8E40A6B4-8D20-EE4D-BF5B-C9004ACF6E6E}" type="datetimeFigureOut">
               <a:rPr lang="fr-FR" smtClean="0"/>
-              <a:t>5/2/13</a:t>
+              <a:t>5/3/13</a:t>
             </a:fld>
             <a:endParaRPr lang="fr-FR"/>
           </a:p>
@@ -421,7 +421,7 @@
           <a:p>
             <a:fld id="{9D456323-9590-BC4F-ADDE-664574C34CDA}" type="datetimeFigureOut">
               <a:rPr lang="fr-FR" smtClean="0"/>
-              <a:t>5/2/13</a:t>
+              <a:t>5/3/13</a:t>
             </a:fld>
             <a:endParaRPr lang="fr-FR"/>
           </a:p>
@@ -5357,7 +5357,42 @@
                 <a:latin typeface="Monaco"/>
                 <a:cs typeface="Monaco"/>
               </a:rPr>
-              <a:t> mv FILE				# Rename a file</a:t>
+              <a:t> </a:t>
+            </a:r>
+            <a:r>
+              <a:rPr lang="en-US" sz="2000" smtClean="0">
+                <a:latin typeface="Monaco"/>
+                <a:cs typeface="Monaco"/>
+              </a:rPr>
+              <a:t>mv </a:t>
+            </a:r>
+            <a:r>
+              <a:rPr lang="en-US" sz="2000" smtClean="0">
+                <a:latin typeface="Monaco"/>
+                <a:cs typeface="Monaco"/>
+              </a:rPr>
+              <a:t>OLD NEW		</a:t>
+            </a:r>
+            <a:r>
+              <a:rPr lang="en-US" sz="2000" smtClean="0">
+                <a:latin typeface="Monaco"/>
+                <a:cs typeface="Monaco"/>
+              </a:rPr>
+              <a:t>	</a:t>
+            </a:r>
+            <a:r>
+              <a:rPr lang="en-US" sz="2000" smtClean="0">
+                <a:latin typeface="Monaco"/>
+                <a:cs typeface="Monaco"/>
+              </a:rPr>
+              <a:t># </a:t>
+            </a:r>
+            <a:r>
+              <a:rPr lang="en-US" sz="2000" dirty="0" smtClean="0">
+                <a:latin typeface="Monaco"/>
+                <a:cs typeface="Monaco"/>
+              </a:rPr>
+              <a:t>Rename a file</a:t>
             </a:r>
           </a:p>
         </p:txBody>
@@ -13149,14 +13184,7 @@
                 <a:latin typeface="Monaco"/>
                 <a:cs typeface="Monaco"/>
               </a:rPr>
-              <a:t> remote add origin https://</a:t>
-            </a:r>
-            <a:r>
-              <a:rPr lang="en-US" sz="1500" dirty="0" smtClean="0">
-                <a:latin typeface="Monaco"/>
-                <a:cs typeface="Monaco"/>
-              </a:rPr>
-              <a:t>…</a:t>
+              <a:t> remote add origin https://…</a:t>
             </a:r>
           </a:p>
           <a:p>

</xml_diff>